<commit_message>
Correct BMI formula and other minor typos
</commit_message>
<xml_diff>
--- a/Workshops/Workshop4.pptx
+++ b/Workshops/Workshop4.pptx
@@ -1385,6 +1385,154 @@
             <a:r>
               <a:rPr/>
               <a:t>grasp.</a:t>
+            </a:r>
+            <a:r>
+              <a:rPr/>
+              <a:t> </a:t>
+            </a:r>
+            <a:r>
+              <a:rPr/>
+              <a:t>Also</a:t>
+            </a:r>
+            <a:r>
+              <a:rPr/>
+              <a:t> </a:t>
+            </a:r>
+            <a:r>
+              <a:rPr/>
+              <a:t>warn</a:t>
+            </a:r>
+            <a:r>
+              <a:rPr/>
+              <a:t> </a:t>
+            </a:r>
+            <a:r>
+              <a:rPr/>
+              <a:t>them</a:t>
+            </a:r>
+            <a:r>
+              <a:rPr/>
+              <a:t> </a:t>
+            </a:r>
+            <a:r>
+              <a:rPr/>
+              <a:t>that</a:t>
+            </a:r>
+            <a:r>
+              <a:rPr/>
+              <a:t> </a:t>
+            </a:r>
+            <a:r>
+              <a:rPr/>
+              <a:t>in</a:t>
+            </a:r>
+            <a:r>
+              <a:rPr/>
+              <a:t> </a:t>
+            </a:r>
+            <a:r>
+              <a:rPr/>
+              <a:t>the</a:t>
+            </a:r>
+            <a:r>
+              <a:rPr/>
+              <a:t> </a:t>
+            </a:r>
+            <a:r>
+              <a:rPr/>
+              <a:t>temp_point</a:t>
+            </a:r>
+            <a:r>
+              <a:rPr/>
+              <a:t> </a:t>
+            </a:r>
+            <a:r>
+              <a:rPr/>
+              <a:t>column,</a:t>
+            </a:r>
+            <a:r>
+              <a:rPr/>
+              <a:t> </a:t>
+            </a:r>
+            <a:r>
+              <a:rPr/>
+              <a:t>it</a:t>
+            </a:r>
+            <a:r>
+              <a:rPr/>
+              <a:t> </a:t>
+            </a:r>
+            <a:r>
+              <a:rPr/>
+              <a:t>should</a:t>
+            </a:r>
+            <a:r>
+              <a:rPr/>
+              <a:t> </a:t>
+            </a:r>
+            <a:r>
+              <a:rPr/>
+              <a:t>in</a:t>
+            </a:r>
+            <a:r>
+              <a:rPr/>
+              <a:t> </a:t>
+            </a:r>
+            <a:r>
+              <a:rPr/>
+              <a:t>fact</a:t>
+            </a:r>
+            <a:r>
+              <a:rPr/>
+              <a:t> </a:t>
+            </a:r>
+            <a:r>
+              <a:rPr/>
+              <a:t>say</a:t>
+            </a:r>
+            <a:r>
+              <a:rPr/>
+              <a:t> </a:t>
+            </a:r>
+            <a:r>
+              <a:rPr/>
+              <a:t>“</a:t>
+            </a:r>
+            <a:r>
+              <a:rPr/>
+              <a:t>temp_c</a:t>
+            </a:r>
+            <a:r>
+              <a:rPr/>
+              <a:t>”</a:t>
+            </a:r>
+            <a:r>
+              <a:rPr/>
+              <a:t> </a:t>
+            </a:r>
+            <a:r>
+              <a:rPr/>
+              <a:t>and</a:t>
+            </a:r>
+            <a:r>
+              <a:rPr/>
+              <a:t> </a:t>
+            </a:r>
+            <a:r>
+              <a:rPr/>
+              <a:t>“</a:t>
+            </a:r>
+            <a:r>
+              <a:rPr/>
+              <a:t>temp_nc</a:t>
+            </a:r>
+            <a:r>
+              <a:rPr/>
+              <a:t>”</a:t>
+            </a:r>
+            <a:r>
+              <a:rPr/>
+              <a:t>.</a:t>
             </a:r>
           </a:p>
         </p:txBody>
@@ -8030,7 +8178,7 @@
               <a:rPr sz="1800">
                 <a:latin typeface="Courier"/>
               </a:rPr>
-              <a:t>(height </a:t>
+              <a:t>(height</a:t>
             </a:r>
             <a:r>
               <a:rPr sz="1800">
@@ -8039,16 +8187,7 @@
                 </a:solidFill>
                 <a:latin typeface="Courier"/>
               </a:rPr>
-              <a:t>/</a:t>
-            </a:r>
-            <a:r>
-              <a:rPr sz="1800">
-                <a:solidFill>
-                  <a:srgbClr val="4070A0"/>
-                </a:solidFill>
-                <a:latin typeface="Courier"/>
-              </a:rPr>
-              <a:t> </a:t>
+              <a:t>^</a:t>
             </a:r>
             <a:r>
               <a:rPr sz="1800">
@@ -8057,37 +8196,13 @@
                 </a:solidFill>
                 <a:latin typeface="Courier"/>
               </a:rPr>
-              <a:t>100</a:t>
-            </a:r>
-            <a:r>
-              <a:rPr sz="1800">
-                <a:latin typeface="Courier"/>
-              </a:rPr>
-              <a:t>)</a:t>
-            </a:r>
-            <a:r>
-              <a:rPr sz="1800">
-                <a:solidFill>
-                  <a:srgbClr val="666666"/>
-                </a:solidFill>
-                <a:latin typeface="Courier"/>
-              </a:rPr>
-              <a:t>^</a:t>
-            </a:r>
-            <a:r>
-              <a:rPr sz="1800">
-                <a:solidFill>
-                  <a:srgbClr val="40A070"/>
-                </a:solidFill>
-                <a:latin typeface="Courier"/>
-              </a:rPr>
               <a:t>2</a:t>
             </a:r>
             <a:r>
               <a:rPr sz="1800">
                 <a:latin typeface="Courier"/>
               </a:rPr>
-              <a:t>))</a:t>
+              <a:t>)))</a:t>
             </a:r>
           </a:p>
         </p:txBody>
@@ -9449,22 +9564,7 @@
               <a:rPr sz="1800">
                 <a:latin typeface="Courier"/>
               </a:rPr>
-              <a:t>(cchic</a:t>
-            </a:r>
-            <a:r>
-              <a:rPr sz="1800">
-                <a:solidFill>
-                  <a:srgbClr val="666666"/>
-                </a:solidFill>
-                <a:latin typeface="Courier"/>
-              </a:rPr>
-              <a:t>$</a:t>
-            </a:r>
-            <a:r>
-              <a:rPr sz="1800">
-                <a:latin typeface="Courier"/>
-              </a:rPr>
-              <a:t>discharge_dttm)))</a:t>
+              <a:t>(discharge_dttm)))</a:t>
             </a:r>
             <a:br/>
             <a:br/>

</xml_diff>

<commit_message>
Update gather/spread to pivot_longer/pivot_wider
</commit_message>
<xml_diff>
--- a/Workshops/Workshop4.pptx
+++ b/Workshops/Workshop4.pptx
@@ -5,7 +5,7 @@
     <p:sldMasterId id="2147483648" r:id="rId1"/>
   </p:sldMasterIdLst>
   <p:notesMasterIdLst>
-    <p:NotesMasterId r:id="rId39"/>
+    <p:NotesMasterId r:id="rId40"/>
   </p:notesMasterIdLst>
   <p:sldIdLst>
     <p:sldId id="256" r:id="rId2"/>
@@ -45,6 +45,7 @@
     <p:sldId id="290" r:id="rId36"/>
     <p:sldId id="291" r:id="rId37"/>
     <p:sldId id="292" r:id="rId38"/>
+    <p:sldId id="293" r:id="rId39"/>
   </p:sldIdLst>
   <p:sldSz cx="12192000" cy="6858000"/>
   <p:notesSz cx="6858000" cy="9144000"/>
@@ -1392,7 +1393,7 @@
             </a:r>
             <a:r>
               <a:rPr/>
-              <a:t>Also</a:t>
+              <a:t>Also,</a:t>
             </a:r>
             <a:r>
               <a:rPr/>
@@ -1408,7 +1409,7 @@
             </a:r>
             <a:r>
               <a:rPr/>
-              <a:t>them</a:t>
+              <a:t>participants</a:t>
             </a:r>
             <a:r>
               <a:rPr/>
@@ -1424,115 +1425,47 @@
             </a:r>
             <a:r>
               <a:rPr/>
-              <a:t>in</a:t>
-            </a:r>
-            <a:r>
-              <a:rPr/>
-              <a:t> </a:t>
-            </a:r>
-            <a:r>
-              <a:rPr/>
-              <a:t>the</a:t>
-            </a:r>
-            <a:r>
-              <a:rPr/>
-              <a:t> </a:t>
-            </a:r>
-            <a:r>
-              <a:rPr/>
-              <a:t>temp_point</a:t>
-            </a:r>
-            <a:r>
-              <a:rPr/>
-              <a:t> </a:t>
-            </a:r>
-            <a:r>
-              <a:rPr/>
-              <a:t>column,</a:t>
-            </a:r>
-            <a:r>
-              <a:rPr/>
-              <a:t> </a:t>
-            </a:r>
-            <a:r>
-              <a:rPr/>
-              <a:t>it</a:t>
-            </a:r>
-            <a:r>
-              <a:rPr/>
-              <a:t> </a:t>
-            </a:r>
-            <a:r>
-              <a:rPr/>
-              <a:t>should</a:t>
-            </a:r>
-            <a:r>
-              <a:rPr/>
-              <a:t> </a:t>
-            </a:r>
-            <a:r>
-              <a:rPr/>
-              <a:t>in</a:t>
-            </a:r>
-            <a:r>
-              <a:rPr/>
-              <a:t> </a:t>
-            </a:r>
-            <a:r>
-              <a:rPr/>
-              <a:t>fact</a:t>
-            </a:r>
-            <a:r>
-              <a:rPr/>
-              <a:t> </a:t>
-            </a:r>
-            <a:r>
-              <a:rPr/>
-              <a:t>say</a:t>
-            </a:r>
-            <a:r>
-              <a:rPr/>
-              <a:t> </a:t>
-            </a:r>
-            <a:r>
-              <a:rPr/>
-              <a:t>“</a:t>
-            </a:r>
-            <a:r>
-              <a:rPr/>
-              <a:t>temp_c</a:t>
-            </a:r>
-            <a:r>
-              <a:rPr/>
-              <a:t>”</a:t>
-            </a:r>
-            <a:r>
-              <a:rPr/>
-              <a:t> </a:t>
-            </a:r>
-            <a:r>
-              <a:rPr/>
-              <a:t>and</a:t>
-            </a:r>
-            <a:r>
-              <a:rPr/>
-              <a:t> </a:t>
-            </a:r>
-            <a:r>
-              <a:rPr/>
-              <a:t>“</a:t>
-            </a:r>
-            <a:r>
-              <a:rPr/>
-              <a:t>temp_nc</a:t>
-            </a:r>
-            <a:r>
-              <a:rPr/>
-              <a:t>”</a:t>
-            </a:r>
-            <a:r>
-              <a:rPr/>
-              <a:t>.</a:t>
+              <a:t>gather/spread</a:t>
+            </a:r>
+            <a:r>
+              <a:rPr/>
+              <a:t> </a:t>
+            </a:r>
+            <a:r>
+              <a:rPr/>
+              <a:t>have</a:t>
+            </a:r>
+            <a:r>
+              <a:rPr/>
+              <a:t> </a:t>
+            </a:r>
+            <a:r>
+              <a:rPr/>
+              <a:t>been</a:t>
+            </a:r>
+            <a:r>
+              <a:rPr/>
+              <a:t> </a:t>
+            </a:r>
+            <a:r>
+              <a:rPr/>
+              <a:t>superseded</a:t>
+            </a:r>
+            <a:r>
+              <a:rPr/>
+              <a:t> </a:t>
+            </a:r>
+            <a:r>
+              <a:rPr/>
+              <a:t>by</a:t>
+            </a:r>
+            <a:r>
+              <a:rPr/>
+              <a:t> </a:t>
+            </a:r>
+            <a:r>
+              <a:rPr/>
+              <a:t>pivot_longer/pivot_wider.</a:t>
             </a:r>
           </a:p>
         </p:txBody>
@@ -1555,120 +1488,6 @@
             <a:fld id="{18BDFEC3-8487-43E8-A154-7C12CBC1FFF2}" type="slidenum">
               <a:rPr lang="en-US"/>
               <a:t>29</a:t>
-            </a:fld>
-            <a:endParaRPr lang="en-US"/>
-          </a:p>
-        </p:txBody>
-      </p:sp>
-    </p:spTree>
-  </p:cSld>
-</p:notes>
-</file>
-
-<file path=ppt/notesSlides/notesSlide6.xml><?xml version="1.0" encoding="utf-8"?>
-<p:notes xmlns:a="http://schemas.openxmlformats.org/drawingml/2006/main" xmlns:r="http://schemas.openxmlformats.org/officeDocument/2006/relationships" xmlns:p="http://schemas.openxmlformats.org/presentationml/2006/main">
-  <p:cSld>
-    <p:spTree>
-      <p:nvGrpSpPr>
-        <p:cNvPr id="1" name=""/>
-        <p:cNvGrpSpPr/>
-        <p:nvPr/>
-      </p:nvGrpSpPr>
-      <p:grpSpPr>
-        <a:xfrm>
-          <a:off x="0" y="0"/>
-          <a:ext cx="0" cy="0"/>
-          <a:chOff x="0" y="0"/>
-          <a:chExt cx="0" cy="0"/>
-        </a:xfrm>
-      </p:grpSpPr>
-      <p:sp>
-        <p:nvSpPr>
-          <p:cNvPr id="2" name="Slide Image Placeholder 1"/>
-          <p:cNvSpPr>
-            <a:spLocks noGrp="1" noRot="1" noChangeAspect="1"/>
-          </p:cNvSpPr>
-          <p:nvPr>
-            <p:ph type="sldImg"/>
-          </p:nvPr>
-        </p:nvSpPr>
-        <p:spPr/>
-      </p:sp>
-      <p:sp>
-        <p:nvSpPr>
-          <p:cNvPr id="3" name="Notes Placeholder 2"/>
-          <p:cNvSpPr>
-            <a:spLocks noGrp="1"/>
-          </p:cNvSpPr>
-          <p:nvPr>
-            <p:ph type="body" idx="1"/>
-          </p:nvPr>
-        </p:nvSpPr>
-        <p:spPr/>
-        <p:txBody>
-          <a:bodyPr/>
-          <a:lstStyle/>
-          <a:p>
-            <a:pPr lvl="0" marL="0" indent="0">
-              <a:buNone/>
-            </a:pPr>
-            <a:r>
-              <a:rPr/>
-              <a:t>Get</a:t>
-            </a:r>
-            <a:r>
-              <a:rPr/>
-              <a:t> </a:t>
-            </a:r>
-            <a:r>
-              <a:rPr/>
-              <a:t>them</a:t>
-            </a:r>
-            <a:r>
-              <a:rPr/>
-              <a:t> </a:t>
-            </a:r>
-            <a:r>
-              <a:rPr/>
-              <a:t>to</a:t>
-            </a:r>
-            <a:r>
-              <a:rPr/>
-              <a:t> </a:t>
-            </a:r>
-            <a:r>
-              <a:rPr/>
-              <a:t>do</a:t>
-            </a:r>
-            <a:r>
-              <a:rPr/>
-              <a:t> </a:t>
-            </a:r>
-            <a:r>
-              <a:rPr/>
-              <a:t>this.</a:t>
-            </a:r>
-          </a:p>
-        </p:txBody>
-      </p:sp>
-      <p:sp>
-        <p:nvSpPr>
-          <p:cNvPr id="4" name="Slide Number Placeholder 3"/>
-          <p:cNvSpPr>
-            <a:spLocks noGrp="1"/>
-          </p:cNvSpPr>
-          <p:nvPr>
-            <p:ph type="sldNum" sz="quarter" idx="10"/>
-          </p:nvPr>
-        </p:nvSpPr>
-        <p:spPr/>
-        <p:txBody>
-          <a:bodyPr/>
-          <a:lstStyle/>
-          <a:p>
-            <a:fld id="{18BDFEC3-8487-43E8-A154-7C12CBC1FFF2}" type="slidenum">
-              <a:rPr lang="en-US"/>
-              <a:t>32</a:t>
             </a:fld>
             <a:endParaRPr lang="en-US"/>
           </a:p>
@@ -10061,79 +9880,79 @@
             </a:pPr>
             <a:r>
               <a:rPr/>
-              <a:t>Convert</a:t>
-            </a:r>
-            <a:r>
-              <a:rPr/>
-              <a:t> </a:t>
-            </a:r>
-            <a:r>
-              <a:rPr/>
-              <a:t>data</a:t>
-            </a:r>
-            <a:r>
-              <a:rPr/>
-              <a:t> </a:t>
-            </a:r>
-            <a:r>
-              <a:rPr/>
-              <a:t>spread</a:t>
-            </a:r>
-            <a:r>
-              <a:rPr/>
-              <a:t> </a:t>
-            </a:r>
-            <a:r>
-              <a:rPr/>
-              <a:t>over</a:t>
-            </a:r>
-            <a:r>
-              <a:rPr/>
-              <a:t> </a:t>
-            </a:r>
-            <a:r>
-              <a:rPr/>
-              <a:t>several</a:t>
-            </a:r>
-            <a:r>
-              <a:rPr/>
-              <a:t> </a:t>
-            </a:r>
-            <a:r>
-              <a:rPr/>
-              <a:t>variables</a:t>
-            </a:r>
-            <a:r>
-              <a:rPr/>
-              <a:t> </a:t>
-            </a:r>
-            <a:r>
-              <a:rPr/>
-              <a:t>into</a:t>
-            </a:r>
-            <a:r>
-              <a:rPr/>
-              <a:t> </a:t>
-            </a:r>
-            <a:r>
-              <a:rPr/>
-              <a:t>a</a:t>
-            </a:r>
-            <a:r>
-              <a:rPr/>
-              <a:t> </a:t>
-            </a:r>
-            <a:r>
-              <a:rPr/>
-              <a:t>single</a:t>
-            </a:r>
-            <a:r>
-              <a:rPr/>
-              <a:t> </a:t>
-            </a:r>
-            <a:r>
-              <a:rPr/>
-              <a:t>one</a:t>
+              <a:t>A</a:t>
+            </a:r>
+            <a:r>
+              <a:rPr/>
+              <a:t> </a:t>
+            </a:r>
+            <a:r>
+              <a:rPr/>
+              <a:t>dataframe</a:t>
+            </a:r>
+            <a:r>
+              <a:rPr/>
+              <a:t> </a:t>
+            </a:r>
+            <a:r>
+              <a:rPr/>
+              <a:t>can</a:t>
+            </a:r>
+            <a:r>
+              <a:rPr/>
+              <a:t> </a:t>
+            </a:r>
+            <a:r>
+              <a:rPr/>
+              <a:t>pivoted</a:t>
+            </a:r>
+            <a:r>
+              <a:rPr/>
+              <a:t> </a:t>
+            </a:r>
+            <a:r>
+              <a:rPr/>
+              <a:t>in</a:t>
+            </a:r>
+            <a:r>
+              <a:rPr/>
+              <a:t> </a:t>
+            </a:r>
+            <a:r>
+              <a:rPr/>
+              <a:t>two</a:t>
+            </a:r>
+            <a:r>
+              <a:rPr/>
+              <a:t> </a:t>
+            </a:r>
+            <a:r>
+              <a:rPr/>
+              <a:t>ways:</a:t>
+            </a:r>
+            <a:r>
+              <a:rPr/>
+              <a:t> </a:t>
+            </a:r>
+            <a:r>
+              <a:rPr/>
+              <a:t>longer</a:t>
+            </a:r>
+            <a:r>
+              <a:rPr/>
+              <a:t> </a:t>
+            </a:r>
+            <a:r>
+              <a:rPr/>
+              <a:t>or</a:t>
+            </a:r>
+            <a:r>
+              <a:rPr/>
+              <a:t> </a:t>
+            </a:r>
+            <a:r>
+              <a:rPr/>
+              <a:t>wider.</a:t>
             </a:r>
           </a:p>
         </p:txBody>
@@ -10541,7 +10360,7 @@
                 </a:solidFill>
                 <a:latin typeface="Courier"/>
               </a:rPr>
-              <a:t>gather</a:t>
+              <a:t>pivot_longer</a:t>
             </a:r>
             <a:r>
               <a:rPr sz="1800">
@@ -10549,6 +10368,13 @@
               </a:rPr>
               <a:t>(</a:t>
             </a:r>
+            <a:br/>
+            <a:r>
+              <a:rPr sz="1800">
+                <a:latin typeface="Courier"/>
+              </a:rPr>
+              <a:t>    </a:t>
+            </a:r>
             <a:r>
               <a:rPr sz="1800">
                 <a:solidFill>
@@ -10556,7 +10382,44 @@
                 </a:solidFill>
                 <a:latin typeface="Courier"/>
               </a:rPr>
-              <a:t>key =</a:t>
+              <a:t>cols =</a:t>
+            </a:r>
+            <a:r>
+              <a:rPr sz="1800">
+                <a:latin typeface="Courier"/>
+              </a:rPr>
+              <a:t> temp_c</a:t>
+            </a:r>
+            <a:r>
+              <a:rPr sz="1800">
+                <a:solidFill>
+                  <a:srgbClr val="666666"/>
+                </a:solidFill>
+                <a:latin typeface="Courier"/>
+              </a:rPr>
+              <a:t>:</a:t>
+            </a:r>
+            <a:r>
+              <a:rPr sz="1800">
+                <a:latin typeface="Courier"/>
+              </a:rPr>
+              <a:t>temp_nc, </a:t>
+            </a:r>
+            <a:br/>
+            <a:r>
+              <a:rPr sz="1800">
+                <a:latin typeface="Courier"/>
+              </a:rPr>
+              <a:t>    </a:t>
+            </a:r>
+            <a:r>
+              <a:rPr sz="1800">
+                <a:solidFill>
+                  <a:srgbClr val="902000"/>
+                </a:solidFill>
+                <a:latin typeface="Courier"/>
+              </a:rPr>
+              <a:t>names_to =</a:t>
             </a:r>
             <a:r>
               <a:rPr sz="1800">
@@ -10577,14 +10440,14 @@
               <a:rPr sz="1800">
                 <a:latin typeface="Courier"/>
               </a:rPr>
-              <a:t>, </a:t>
+              <a:t>,</a:t>
             </a:r>
             <a:br/>
             <a:r>
               <a:rPr sz="1800">
                 <a:latin typeface="Courier"/>
               </a:rPr>
-              <a:t>                </a:t>
+              <a:t>    </a:t>
             </a:r>
             <a:r>
               <a:rPr sz="1800">
@@ -10593,7 +10456,7 @@
                 </a:solidFill>
                 <a:latin typeface="Courier"/>
               </a:rPr>
-              <a:t>value =</a:t>
+              <a:t>values_to =</a:t>
             </a:r>
             <a:r>
               <a:rPr sz="1800">
@@ -10610,18 +10473,12 @@
               </a:rPr>
               <a:t>"temperature"</a:t>
             </a:r>
-            <a:r>
-              <a:rPr sz="1800">
-                <a:latin typeface="Courier"/>
-              </a:rPr>
-              <a:t>, </a:t>
-            </a:r>
             <a:br/>
             <a:r>
               <a:rPr sz="1800">
                 <a:latin typeface="Courier"/>
               </a:rPr>
-              <a:t>                temp_c</a:t>
+              <a:t>  ) </a:t>
             </a:r>
             <a:r>
               <a:rPr sz="1800">
@@ -10630,13 +10487,86 @@
                 </a:solidFill>
                 <a:latin typeface="Courier"/>
               </a:rPr>
-              <a:t>:</a:t>
-            </a:r>
-            <a:r>
-              <a:rPr sz="1800">
-                <a:latin typeface="Courier"/>
-              </a:rPr>
-              <a:t>temp_nc)</a:t>
+              <a:t>%&gt;%</a:t>
+            </a:r>
+            <a:r>
+              <a:rPr sz="1800">
+                <a:solidFill>
+                  <a:srgbClr val="4070A0"/>
+                </a:solidFill>
+                <a:latin typeface="Courier"/>
+              </a:rPr>
+              <a:t> </a:t>
+            </a:r>
+            <a:br/>
+            <a:r>
+              <a:rPr sz="1800">
+                <a:solidFill>
+                  <a:srgbClr val="4070A0"/>
+                </a:solidFill>
+                <a:latin typeface="Courier"/>
+              </a:rPr>
+              <a:t>  </a:t>
+            </a:r>
+            <a:r>
+              <a:rPr sz="1800">
+                <a:latin typeface="Courier"/>
+              </a:rPr>
+              <a:t>dplyr</a:t>
+            </a:r>
+            <a:r>
+              <a:rPr sz="1800">
+                <a:solidFill>
+                  <a:srgbClr val="666666"/>
+                </a:solidFill>
+                <a:latin typeface="Courier"/>
+              </a:rPr>
+              <a:t>::</a:t>
+            </a:r>
+            <a:r>
+              <a:rPr sz="1800" b="1">
+                <a:solidFill>
+                  <a:srgbClr val="007020"/>
+                </a:solidFill>
+                <a:latin typeface="Courier"/>
+              </a:rPr>
+              <a:t>select</a:t>
+            </a:r>
+            <a:r>
+              <a:rPr sz="1800">
+                <a:latin typeface="Courier"/>
+              </a:rPr>
+              <a:t>(nhs_number, </a:t>
+            </a:r>
+            <a:r>
+              <a:rPr sz="1800" b="1">
+                <a:solidFill>
+                  <a:srgbClr val="007020"/>
+                </a:solidFill>
+                <a:latin typeface="Courier"/>
+              </a:rPr>
+              <a:t>contains</a:t>
+            </a:r>
+            <a:r>
+              <a:rPr sz="1800">
+                <a:latin typeface="Courier"/>
+              </a:rPr>
+              <a:t>(</a:t>
+            </a:r>
+            <a:r>
+              <a:rPr sz="1800">
+                <a:solidFill>
+                  <a:srgbClr val="4070A0"/>
+                </a:solidFill>
+                <a:latin typeface="Courier"/>
+              </a:rPr>
+              <a:t>"temp"</a:t>
+            </a:r>
+            <a:r>
+              <a:rPr sz="1800">
+                <a:latin typeface="Courier"/>
+              </a:rPr>
+              <a:t>))</a:t>
             </a:r>
             <a:br/>
             <a:br/>
@@ -10654,6 +10584,17 @@
                 <a:latin typeface="Courier"/>
               </a:rPr>
               <a:t>(cchic_long)</a:t>
+            </a:r>
+          </a:p>
+          <a:p>
+            <a:pPr lvl="0" marL="1270000" indent="0">
+              <a:buNone/>
+            </a:pPr>
+            <a:r>
+              <a:rPr sz="1800">
+                <a:latin typeface="Courier"/>
+              </a:rPr>
+              <a:t>## [1] "nhs_number"  "temp_point"  "temperature"</a:t>
             </a:r>
           </a:p>
         </p:txBody>
@@ -10722,7 +10663,15 @@
             </a:r>
             <a:r>
               <a:rPr/>
-              <a:t>gathered</a:t>
+              <a:t>“</a:t>
+            </a:r>
+            <a:r>
+              <a:rPr/>
+              <a:t>longer</a:t>
+            </a:r>
+            <a:r>
+              <a:rPr/>
+              <a:t>”</a:t>
             </a:r>
             <a:r>
               <a:rPr/>
@@ -10933,312 +10882,36 @@
           <a:chExt cx="0" cy="0"/>
         </a:xfrm>
       </p:grpSpPr>
-      <p:sp>
-        <p:nvSpPr>
-          <p:cNvPr id="2" name="Title 1">
-            <a:extLst>
-              <a:ext uri="{FF2B5EF4-FFF2-40B4-BE49-F238E27FC236}">
-                <a16:creationId xmlns:a16="http://schemas.microsoft.com/office/drawing/2014/main" id="{5567D468-EE70-CD4E-A3AC-039CC11EF1FB}"/>
-              </a:ext>
-            </a:extLst>
-          </p:cNvPr>
-          <p:cNvSpPr>
-            <a:spLocks noGrp="1"/>
-          </p:cNvSpPr>
-          <p:nvPr>
-            <p:ph type="title"/>
-          </p:nvPr>
-        </p:nvSpPr>
-        <p:spPr/>
-        <p:txBody>
-          <a:bodyPr/>
-          <a:lstStyle/>
-          <a:p>
-            <a:pPr lvl="0" marL="0" indent="0">
-              <a:buNone/>
-            </a:pPr>
-            <a:r>
-              <a:rPr/>
-              <a:t>What</a:t>
-            </a:r>
-            <a:r>
-              <a:rPr/>
-              <a:t> </a:t>
-            </a:r>
-            <a:r>
-              <a:rPr/>
-              <a:t>if</a:t>
-            </a:r>
-            <a:r>
-              <a:rPr/>
-              <a:t> </a:t>
-            </a:r>
-            <a:r>
-              <a:rPr/>
-              <a:t>we</a:t>
-            </a:r>
-            <a:r>
-              <a:rPr/>
-              <a:t> </a:t>
-            </a:r>
-            <a:r>
-              <a:rPr/>
-              <a:t>want</a:t>
-            </a:r>
-            <a:r>
-              <a:rPr/>
-              <a:t> </a:t>
-            </a:r>
-            <a:r>
-              <a:rPr/>
-              <a:t>to</a:t>
-            </a:r>
-            <a:r>
-              <a:rPr/>
-              <a:t> </a:t>
-            </a:r>
-            <a:r>
-              <a:rPr/>
-              <a:t>convert</a:t>
-            </a:r>
-            <a:r>
-              <a:rPr/>
-              <a:t> </a:t>
-            </a:r>
-            <a:r>
-              <a:rPr/>
-              <a:t>it</a:t>
-            </a:r>
-            <a:r>
-              <a:rPr/>
-              <a:t> </a:t>
-            </a:r>
-            <a:r>
-              <a:rPr/>
-              <a:t>back?</a:t>
-            </a:r>
-          </a:p>
-        </p:txBody>
-      </p:sp>
-      <p:sp>
-        <p:nvSpPr>
-          <p:cNvPr id="3" name="Content Placeholder 2">
-            <a:extLst>
-              <a:ext uri="{FF2B5EF4-FFF2-40B4-BE49-F238E27FC236}">
-                <a16:creationId xmlns:a16="http://schemas.microsoft.com/office/drawing/2014/main" id="{D10DDA37-E46B-B641-BC9F-636CB92A2C08}"/>
-              </a:ext>
-            </a:extLst>
-          </p:cNvPr>
-          <p:cNvSpPr>
-            <a:spLocks noGrp="1"/>
-          </p:cNvSpPr>
-          <p:nvPr>
-            <p:ph idx="1"/>
-          </p:nvPr>
-        </p:nvSpPr>
-        <p:spPr/>
-        <p:txBody>
-          <a:bodyPr/>
-          <a:lstStyle/>
-          <a:p>
-            <a:pPr lvl="0" marL="0" indent="0">
-              <a:buNone/>
-            </a:pPr>
-            <a:r>
-              <a:rPr/>
-              <a:t>We can use the </a:t>
-            </a:r>
-            <a:r>
-              <a:rPr sz="1800">
-                <a:latin typeface="Courier"/>
-              </a:rPr>
-              <a:t>tidyr</a:t>
-            </a:r>
-            <a:r>
-              <a:rPr/>
-              <a:t> function, </a:t>
-            </a:r>
-            <a:r>
-              <a:rPr sz="1800">
-                <a:latin typeface="Courier"/>
-              </a:rPr>
-              <a:t>spread()</a:t>
-            </a:r>
-            <a:r>
-              <a:rPr/>
-              <a:t>.</a:t>
-            </a:r>
-          </a:p>
-          <a:p>
-            <a:pPr lvl="0" marL="1270000" indent="0">
-              <a:buNone/>
-            </a:pPr>
-            <a:r>
-              <a:rPr sz="1800">
-                <a:latin typeface="Courier"/>
-              </a:rPr>
-              <a:t>cchic_reverted &lt;-</a:t>
-            </a:r>
-            <a:r>
-              <a:rPr sz="1800">
-                <a:solidFill>
-                  <a:srgbClr val="4070A0"/>
-                </a:solidFill>
-                <a:latin typeface="Courier"/>
-              </a:rPr>
-              <a:t> </a:t>
-            </a:r>
-            <a:r>
-              <a:rPr sz="1800">
-                <a:latin typeface="Courier"/>
-              </a:rPr>
-              <a:t>cchic_long </a:t>
-            </a:r>
-            <a:r>
-              <a:rPr sz="1800">
-                <a:solidFill>
-                  <a:srgbClr val="666666"/>
-                </a:solidFill>
-                <a:latin typeface="Courier"/>
-              </a:rPr>
-              <a:t>%&gt;%</a:t>
-            </a:r>
-            <a:br/>
-            <a:r>
-              <a:rPr sz="1800">
-                <a:solidFill>
-                  <a:srgbClr val="4070A0"/>
-                </a:solidFill>
-                <a:latin typeface="Courier"/>
-              </a:rPr>
-              <a:t>  </a:t>
-            </a:r>
-            <a:r>
-              <a:rPr sz="1800">
-                <a:latin typeface="Courier"/>
-              </a:rPr>
-              <a:t>tidyr</a:t>
-            </a:r>
-            <a:r>
-              <a:rPr sz="1800">
-                <a:solidFill>
-                  <a:srgbClr val="666666"/>
-                </a:solidFill>
-                <a:latin typeface="Courier"/>
-              </a:rPr>
-              <a:t>::</a:t>
-            </a:r>
-            <a:r>
-              <a:rPr sz="1800" b="1">
-                <a:solidFill>
-                  <a:srgbClr val="007020"/>
-                </a:solidFill>
-                <a:latin typeface="Courier"/>
-              </a:rPr>
-              <a:t>spread</a:t>
-            </a:r>
-            <a:r>
-              <a:rPr sz="1800">
-                <a:latin typeface="Courier"/>
-              </a:rPr>
-              <a:t>(</a:t>
-            </a:r>
-            <a:r>
-              <a:rPr sz="1800">
-                <a:solidFill>
-                  <a:srgbClr val="902000"/>
-                </a:solidFill>
-                <a:latin typeface="Courier"/>
-              </a:rPr>
-              <a:t>key =</a:t>
-            </a:r>
-            <a:r>
-              <a:rPr sz="1800">
-                <a:latin typeface="Courier"/>
-              </a:rPr>
-              <a:t> </a:t>
-            </a:r>
-            <a:r>
-              <a:rPr sz="1800">
-                <a:solidFill>
-                  <a:srgbClr val="4070A0"/>
-                </a:solidFill>
-                <a:latin typeface="Courier"/>
-              </a:rPr>
-              <a:t>"temp_point"</a:t>
-            </a:r>
-            <a:r>
-              <a:rPr sz="1800">
-                <a:latin typeface="Courier"/>
-              </a:rPr>
-              <a:t>, </a:t>
-            </a:r>
-            <a:br/>
-            <a:r>
-              <a:rPr sz="1800">
-                <a:latin typeface="Courier"/>
-              </a:rPr>
-              <a:t>                </a:t>
-            </a:r>
-            <a:r>
-              <a:rPr sz="1800">
-                <a:solidFill>
-                  <a:srgbClr val="902000"/>
-                </a:solidFill>
-                <a:latin typeface="Courier"/>
-              </a:rPr>
-              <a:t>value =</a:t>
-            </a:r>
-            <a:r>
-              <a:rPr sz="1800">
-                <a:latin typeface="Courier"/>
-              </a:rPr>
-              <a:t> </a:t>
-            </a:r>
-            <a:r>
-              <a:rPr sz="1800">
-                <a:solidFill>
-                  <a:srgbClr val="4070A0"/>
-                </a:solidFill>
-                <a:latin typeface="Courier"/>
-              </a:rPr>
-              <a:t>"temperature"</a:t>
-            </a:r>
-            <a:r>
-              <a:rPr sz="1800">
-                <a:latin typeface="Courier"/>
-              </a:rPr>
-              <a:t>)</a:t>
-            </a:r>
-            <a:br/>
-            <a:br/>
-            <a:r>
-              <a:rPr sz="1800" b="1">
-                <a:solidFill>
-                  <a:srgbClr val="007020"/>
-                </a:solidFill>
-                <a:latin typeface="Courier"/>
-              </a:rPr>
-              <a:t>names</a:t>
-            </a:r>
-            <a:r>
-              <a:rPr sz="1800">
-                <a:latin typeface="Courier"/>
-              </a:rPr>
-              <a:t>(cchic_reverted)</a:t>
-            </a:r>
-          </a:p>
-          <a:p>
-            <a:pPr lvl="0" marL="0" indent="0">
-              <a:buNone/>
-            </a:pPr>
-            <a:r>
-              <a:rPr/>
-              <a:t>Notice that the variables “temp_c” and “temp_nc” are seperate again.</a:t>
-            </a:r>
-          </a:p>
-        </p:txBody>
-      </p:sp>
+      <p:pic>
+        <p:nvPicPr>
+          <p:cNvPr descr="Workshop4_files/figure-pptx/unnamed-chunk-25-1.png" id="0" name="Picture 1"/>
+          <p:cNvPicPr>
+            <a:picLocks noGrp="1" noChangeAspect="1"/>
+          </p:cNvPicPr>
+          <p:nvPr/>
+        </p:nvPicPr>
+        <p:blipFill>
+          <a:blip r:embed="rId2"/>
+          <a:stretch>
+            <a:fillRect/>
+          </a:stretch>
+        </p:blipFill>
+        <p:spPr bwMode="auto">
+          <a:xfrm>
+            <a:off x="3378200" y="1816100"/>
+            <a:ext cx="5435600" cy="4343400"/>
+          </a:xfrm>
+          <a:prstGeom prst="rect">
+            <a:avLst/>
+          </a:prstGeom>
+          <a:noFill/>
+          <a:ln w="9525">
+            <a:noFill/>
+            <a:headEnd/>
+            <a:tailEnd/>
+          </a:ln>
+        </p:spPr>
+      </p:pic>
     </p:spTree>
   </p:cSld>
 </p:sld>
@@ -11287,23 +10960,63 @@
             </a:pPr>
             <a:r>
               <a:rPr/>
-              <a:t>7.</a:t>
-            </a:r>
-            <a:r>
-              <a:rPr/>
-              <a:t> </a:t>
-            </a:r>
-            <a:r>
-              <a:rPr/>
-              <a:t>Deleting</a:t>
-            </a:r>
-            <a:r>
-              <a:rPr/>
-              <a:t> </a:t>
-            </a:r>
-            <a:r>
-              <a:rPr/>
-              <a:t>columns</a:t>
+              <a:t>What</a:t>
+            </a:r>
+            <a:r>
+              <a:rPr/>
+              <a:t> </a:t>
+            </a:r>
+            <a:r>
+              <a:rPr/>
+              <a:t>if</a:t>
+            </a:r>
+            <a:r>
+              <a:rPr/>
+              <a:t> </a:t>
+            </a:r>
+            <a:r>
+              <a:rPr/>
+              <a:t>we</a:t>
+            </a:r>
+            <a:r>
+              <a:rPr/>
+              <a:t> </a:t>
+            </a:r>
+            <a:r>
+              <a:rPr/>
+              <a:t>want</a:t>
+            </a:r>
+            <a:r>
+              <a:rPr/>
+              <a:t> </a:t>
+            </a:r>
+            <a:r>
+              <a:rPr/>
+              <a:t>to</a:t>
+            </a:r>
+            <a:r>
+              <a:rPr/>
+              <a:t> </a:t>
+            </a:r>
+            <a:r>
+              <a:rPr/>
+              <a:t>convert</a:t>
+            </a:r>
+            <a:r>
+              <a:rPr/>
+              <a:t> </a:t>
+            </a:r>
+            <a:r>
+              <a:rPr/>
+              <a:t>it</a:t>
+            </a:r>
+            <a:r>
+              <a:rPr/>
+              <a:t> </a:t>
+            </a:r>
+            <a:r>
+              <a:rPr/>
+              <a:t>back?</a:t>
             </a:r>
           </a:p>
         </p:txBody>
@@ -11334,17 +11047,27 @@
             </a:pPr>
             <a:r>
               <a:rPr/>
-              <a:t>What if we wanted to remove the </a:t>
-            </a:r>
-            <a:r>
-              <a:rPr sz="1800">
-                <a:latin typeface="Courier"/>
-              </a:rPr>
-              <a:t>temp_nc</a:t>
-            </a:r>
-            <a:r>
-              <a:rPr/>
-              <a:t> variable?</a:t>
+              <a:t>We can use the </a:t>
+            </a:r>
+            <a:r>
+              <a:rPr sz="1800">
+                <a:latin typeface="Courier"/>
+              </a:rPr>
+              <a:t>tidyr</a:t>
+            </a:r>
+            <a:r>
+              <a:rPr/>
+              <a:t> function, </a:t>
+            </a:r>
+            <a:r>
+              <a:rPr sz="1800">
+                <a:latin typeface="Courier"/>
+              </a:rPr>
+              <a:t>pivot_wider()</a:t>
+            </a:r>
+            <a:r>
+              <a:rPr/>
+              <a:t>.</a:t>
             </a:r>
           </a:p>
           <a:p>
@@ -11355,7 +11078,32 @@
               <a:rPr sz="1800">
                 <a:latin typeface="Courier"/>
               </a:rPr>
-              <a:t>cchic </a:t>
+              <a:t>cchic_reverted &lt;-</a:t>
+            </a:r>
+            <a:r>
+              <a:rPr sz="1800">
+                <a:solidFill>
+                  <a:srgbClr val="4070A0"/>
+                </a:solidFill>
+                <a:latin typeface="Courier"/>
+              </a:rPr>
+              <a:t> </a:t>
+            </a:r>
+            <a:br/>
+            <a:r>
+              <a:rPr sz="1800">
+                <a:solidFill>
+                  <a:srgbClr val="4070A0"/>
+                </a:solidFill>
+                <a:latin typeface="Courier"/>
+              </a:rPr>
+              <a:t>  </a:t>
+            </a:r>
+            <a:r>
+              <a:rPr sz="1800">
+                <a:latin typeface="Courier"/>
+              </a:rPr>
+              <a:t>cchic_long </a:t>
             </a:r>
             <a:r>
               <a:rPr sz="1800">
@@ -11380,7 +11128,7 @@
               <a:rPr sz="1800">
                 <a:latin typeface="Courier"/>
               </a:rPr>
-              <a:t>dplyr</a:t>
+              <a:t>tidyr</a:t>
             </a:r>
             <a:r>
               <a:rPr sz="1800">
@@ -11398,7 +11146,7 @@
                 </a:solidFill>
                 <a:latin typeface="Courier"/>
               </a:rPr>
-              <a:t>select</a:t>
+              <a:t>pivot_wider</a:t>
             </a:r>
             <a:r>
               <a:rPr sz="1800">
@@ -11406,20 +11154,84 @@
               </a:rPr>
               <a:t>(</a:t>
             </a:r>
-            <a:r>
-              <a:rPr sz="1800">
-                <a:solidFill>
-                  <a:srgbClr val="666666"/>
-                </a:solidFill>
-                <a:latin typeface="Courier"/>
-              </a:rPr>
-              <a:t>-</a:t>
-            </a:r>
-            <a:r>
-              <a:rPr sz="1800">
-                <a:latin typeface="Courier"/>
-              </a:rPr>
-              <a:t>temp_nc)</a:t>
+            <a:br/>
+            <a:r>
+              <a:rPr sz="1800">
+                <a:latin typeface="Courier"/>
+              </a:rPr>
+              <a:t>    </a:t>
+            </a:r>
+            <a:r>
+              <a:rPr sz="1800">
+                <a:solidFill>
+                  <a:srgbClr val="902000"/>
+                </a:solidFill>
+                <a:latin typeface="Courier"/>
+              </a:rPr>
+              <a:t>names_from =</a:t>
+            </a:r>
+            <a:r>
+              <a:rPr sz="1800">
+                <a:latin typeface="Courier"/>
+              </a:rPr>
+              <a:t> temp_point,</a:t>
+            </a:r>
+            <a:br/>
+            <a:r>
+              <a:rPr sz="1800">
+                <a:latin typeface="Courier"/>
+              </a:rPr>
+              <a:t>    </a:t>
+            </a:r>
+            <a:r>
+              <a:rPr sz="1800">
+                <a:solidFill>
+                  <a:srgbClr val="902000"/>
+                </a:solidFill>
+                <a:latin typeface="Courier"/>
+              </a:rPr>
+              <a:t>values_from =</a:t>
+            </a:r>
+            <a:r>
+              <a:rPr sz="1800">
+                <a:latin typeface="Courier"/>
+              </a:rPr>
+              <a:t> temperature</a:t>
+            </a:r>
+            <a:br/>
+            <a:r>
+              <a:rPr sz="1800">
+                <a:latin typeface="Courier"/>
+              </a:rPr>
+              <a:t>  )</a:t>
+            </a:r>
+            <a:br/>
+            <a:br/>
+            <a:r>
+              <a:rPr sz="1800" b="1">
+                <a:solidFill>
+                  <a:srgbClr val="007020"/>
+                </a:solidFill>
+                <a:latin typeface="Courier"/>
+              </a:rPr>
+              <a:t>names</a:t>
+            </a:r>
+            <a:r>
+              <a:rPr sz="1800">
+                <a:latin typeface="Courier"/>
+              </a:rPr>
+              <a:t>(cchic_reverted)</a:t>
+            </a:r>
+          </a:p>
+          <a:p>
+            <a:pPr lvl="0" marL="1270000" indent="0">
+              <a:buNone/>
+            </a:pPr>
+            <a:r>
+              <a:rPr sz="1800">
+                <a:latin typeface="Courier"/>
+              </a:rPr>
+              <a:t>## [1] "nhs_number" "temp_c"     "temp_nc"</a:t>
             </a:r>
           </a:p>
           <a:p>
@@ -11428,26 +11240,7 @@
             </a:pPr>
             <a:r>
               <a:rPr/>
-              <a:t>The </a:t>
-            </a:r>
-            <a:r>
-              <a:rPr sz="1800">
-                <a:latin typeface="Courier"/>
-              </a:rPr>
-              <a:t>-</a:t>
-            </a:r>
-            <a:r>
-              <a:rPr/>
-              <a:t> sign means deselect here.</a:t>
-            </a:r>
-          </a:p>
-          <a:p>
-            <a:pPr lvl="0" marL="0" indent="0">
-              <a:buNone/>
-            </a:pPr>
-            <a:r>
-              <a:rPr/>
-              <a:t>Don’t forget to assign the above code to something, otherwise the output won’t be saved.</a:t>
+              <a:t>Notice that the variables “temp_c” and “temp_nc” are seperate again.</a:t>
             </a:r>
           </a:p>
         </p:txBody>
@@ -11500,7 +11293,23 @@
             </a:pPr>
             <a:r>
               <a:rPr/>
-              <a:t>Excercise</a:t>
+              <a:t>7.</a:t>
+            </a:r>
+            <a:r>
+              <a:rPr/>
+              <a:t> </a:t>
+            </a:r>
+            <a:r>
+              <a:rPr/>
+              <a:t>Deleting</a:t>
+            </a:r>
+            <a:r>
+              <a:rPr/>
+              <a:t> </a:t>
+            </a:r>
+            <a:r>
+              <a:rPr/>
+              <a:t>columns</a:t>
             </a:r>
           </a:p>
         </p:txBody>
@@ -11526,69 +11335,125 @@
           <a:bodyPr/>
           <a:lstStyle/>
           <a:p>
-            <a:pPr lvl="1">
-              <a:buAutoNum type="arabicPeriod"/>
+            <a:pPr lvl="0" marL="0" indent="0">
+              <a:buNone/>
             </a:pPr>
             <a:r>
               <a:rPr/>
-              <a:t>How many patients weigh more than 70kg?</a:t>
-            </a:r>
-          </a:p>
-          <a:p>
-            <a:pPr lvl="2"/>
-            <a:r>
-              <a:rPr/>
-              <a:t>Hint - look at the </a:t>
-            </a:r>
-            <a:r>
-              <a:rPr sz="1800">
-                <a:latin typeface="Courier"/>
-              </a:rPr>
-              <a:t>n()</a:t>
-            </a:r>
-            <a:r>
-              <a:rPr/>
-              <a:t> function.</a:t>
-            </a:r>
-          </a:p>
-          <a:p>
-            <a:pPr lvl="1">
-              <a:buAutoNum type="arabicPeriod"/>
+              <a:t>What if we wanted to remove the </a:t>
+            </a:r>
+            <a:r>
+              <a:rPr sz="1800">
+                <a:latin typeface="Courier"/>
+              </a:rPr>
+              <a:t>temp_nc</a:t>
+            </a:r>
+            <a:r>
+              <a:rPr/>
+              <a:t> variable?</a:t>
+            </a:r>
+          </a:p>
+          <a:p>
+            <a:pPr lvl="0" marL="1270000" indent="0">
+              <a:buNone/>
             </a:pPr>
             <a:r>
-              <a:rPr/>
-              <a:t>Outcome of patients who were 60 years or older?</a:t>
-            </a:r>
-          </a:p>
-          <a:p>
-            <a:pPr lvl="2"/>
-            <a:r>
-              <a:rPr/>
-              <a:t>What is the mean length of stay of patients who are 60 years or older?</a:t>
-            </a:r>
-          </a:p>
-          <a:p>
-            <a:pPr lvl="2"/>
-            <a:r>
-              <a:rPr/>
-              <a:t>How many of these patients were discharged alive?</a:t>
-            </a:r>
-          </a:p>
-          <a:p>
-            <a:pPr lvl="2"/>
-            <a:r>
-              <a:rPr/>
-              <a:t>Hint - the variable </a:t>
-            </a:r>
-            <a:r>
-              <a:rPr sz="1800">
-                <a:latin typeface="Courier"/>
-              </a:rPr>
-              <a:t>vital_status</a:t>
-            </a:r>
-            <a:r>
-              <a:rPr/>
-              <a:t> indicates if the patient was alive or dead on discharge.</a:t>
+              <a:rPr sz="1800">
+                <a:latin typeface="Courier"/>
+              </a:rPr>
+              <a:t>cchic </a:t>
+            </a:r>
+            <a:r>
+              <a:rPr sz="1800">
+                <a:solidFill>
+                  <a:srgbClr val="666666"/>
+                </a:solidFill>
+                <a:latin typeface="Courier"/>
+              </a:rPr>
+              <a:t>%&gt;%</a:t>
+            </a:r>
+            <a:br/>
+            <a:r>
+              <a:rPr sz="1800">
+                <a:solidFill>
+                  <a:srgbClr val="4070A0"/>
+                </a:solidFill>
+                <a:latin typeface="Courier"/>
+              </a:rPr>
+              <a:t>  </a:t>
+            </a:r>
+            <a:r>
+              <a:rPr sz="1800">
+                <a:latin typeface="Courier"/>
+              </a:rPr>
+              <a:t>dplyr</a:t>
+            </a:r>
+            <a:r>
+              <a:rPr sz="1800">
+                <a:solidFill>
+                  <a:srgbClr val="666666"/>
+                </a:solidFill>
+                <a:latin typeface="Courier"/>
+              </a:rPr>
+              <a:t>::</a:t>
+            </a:r>
+            <a:r>
+              <a:rPr sz="1800" b="1">
+                <a:solidFill>
+                  <a:srgbClr val="007020"/>
+                </a:solidFill>
+                <a:latin typeface="Courier"/>
+              </a:rPr>
+              <a:t>select</a:t>
+            </a:r>
+            <a:r>
+              <a:rPr sz="1800">
+                <a:latin typeface="Courier"/>
+              </a:rPr>
+              <a:t>(</a:t>
+            </a:r>
+            <a:r>
+              <a:rPr sz="1800">
+                <a:solidFill>
+                  <a:srgbClr val="666666"/>
+                </a:solidFill>
+                <a:latin typeface="Courier"/>
+              </a:rPr>
+              <a:t>-</a:t>
+            </a:r>
+            <a:r>
+              <a:rPr sz="1800">
+                <a:latin typeface="Courier"/>
+              </a:rPr>
+              <a:t>temp_nc)</a:t>
+            </a:r>
+          </a:p>
+          <a:p>
+            <a:pPr lvl="0" marL="0" indent="0">
+              <a:buNone/>
+            </a:pPr>
+            <a:r>
+              <a:rPr/>
+              <a:t>The </a:t>
+            </a:r>
+            <a:r>
+              <a:rPr sz="1800">
+                <a:latin typeface="Courier"/>
+              </a:rPr>
+              <a:t>-</a:t>
+            </a:r>
+            <a:r>
+              <a:rPr/>
+              <a:t> sign means deselect here.</a:t>
+            </a:r>
+          </a:p>
+          <a:p>
+            <a:pPr lvl="0" marL="0" indent="0">
+              <a:buNone/>
+            </a:pPr>
+            <a:r>
+              <a:rPr/>
+              <a:t>Don’t forget to assign the above code to something, otherwise the output won’t be saved.</a:t>
             </a:r>
           </a:p>
         </p:txBody>
@@ -11641,55 +11506,7 @@
             </a:pPr>
             <a:r>
               <a:rPr/>
-              <a:t>How</a:t>
-            </a:r>
-            <a:r>
-              <a:rPr/>
-              <a:t> </a:t>
-            </a:r>
-            <a:r>
-              <a:rPr/>
-              <a:t>many</a:t>
-            </a:r>
-            <a:r>
-              <a:rPr/>
-              <a:t> </a:t>
-            </a:r>
-            <a:r>
-              <a:rPr/>
-              <a:t>patients</a:t>
-            </a:r>
-            <a:r>
-              <a:rPr/>
-              <a:t> </a:t>
-            </a:r>
-            <a:r>
-              <a:rPr/>
-              <a:t>weigh</a:t>
-            </a:r>
-            <a:r>
-              <a:rPr/>
-              <a:t> </a:t>
-            </a:r>
-            <a:r>
-              <a:rPr/>
-              <a:t>more</a:t>
-            </a:r>
-            <a:r>
-              <a:rPr/>
-              <a:t> </a:t>
-            </a:r>
-            <a:r>
-              <a:rPr/>
-              <a:t>than</a:t>
-            </a:r>
-            <a:r>
-              <a:rPr/>
-              <a:t> </a:t>
-            </a:r>
-            <a:r>
-              <a:rPr/>
-              <a:t>70kg?</a:t>
+              <a:t>Excercise</a:t>
             </a:r>
           </a:p>
         </p:txBody>
@@ -11715,189 +11532,69 @@
           <a:bodyPr/>
           <a:lstStyle/>
           <a:p>
-            <a:pPr lvl="0" marL="1270000" indent="0">
-              <a:buNone/>
+            <a:pPr lvl="1">
+              <a:buAutoNum type="arabicPeriod"/>
             </a:pPr>
             <a:r>
-              <a:rPr sz="1800">
-                <a:latin typeface="Courier"/>
-              </a:rPr>
-              <a:t>cchic </a:t>
-            </a:r>
-            <a:r>
-              <a:rPr sz="1800">
-                <a:solidFill>
-                  <a:srgbClr val="666666"/>
-                </a:solidFill>
-                <a:latin typeface="Courier"/>
-              </a:rPr>
-              <a:t>%&gt;%</a:t>
-            </a:r>
-            <a:br/>
-            <a:r>
-              <a:rPr sz="1800">
-                <a:solidFill>
-                  <a:srgbClr val="4070A0"/>
-                </a:solidFill>
-                <a:latin typeface="Courier"/>
-              </a:rPr>
-              <a:t>  </a:t>
-            </a:r>
-            <a:r>
-              <a:rPr sz="1800">
-                <a:latin typeface="Courier"/>
-              </a:rPr>
-              <a:t>dplyr</a:t>
-            </a:r>
-            <a:r>
-              <a:rPr sz="1800">
-                <a:solidFill>
-                  <a:srgbClr val="666666"/>
-                </a:solidFill>
-                <a:latin typeface="Courier"/>
-              </a:rPr>
-              <a:t>::</a:t>
-            </a:r>
-            <a:r>
-              <a:rPr sz="1800" b="1">
-                <a:solidFill>
-                  <a:srgbClr val="007020"/>
-                </a:solidFill>
-                <a:latin typeface="Courier"/>
-              </a:rPr>
-              <a:t>filter</a:t>
-            </a:r>
-            <a:r>
-              <a:rPr sz="1800">
-                <a:latin typeface="Courier"/>
-              </a:rPr>
-              <a:t>(weight </a:t>
-            </a:r>
-            <a:r>
-              <a:rPr sz="1800">
-                <a:solidFill>
-                  <a:srgbClr val="666666"/>
-                </a:solidFill>
-                <a:latin typeface="Courier"/>
-              </a:rPr>
-              <a:t>&gt;</a:t>
-            </a:r>
-            <a:r>
-              <a:rPr sz="1800">
-                <a:solidFill>
-                  <a:srgbClr val="4070A0"/>
-                </a:solidFill>
-                <a:latin typeface="Courier"/>
-              </a:rPr>
-              <a:t> </a:t>
-            </a:r>
-            <a:r>
-              <a:rPr sz="1800">
-                <a:solidFill>
-                  <a:srgbClr val="40A070"/>
-                </a:solidFill>
-                <a:latin typeface="Courier"/>
-              </a:rPr>
-              <a:t>70</a:t>
-            </a:r>
-            <a:r>
-              <a:rPr sz="1800">
-                <a:latin typeface="Courier"/>
-              </a:rPr>
-              <a:t>) </a:t>
-            </a:r>
-            <a:r>
-              <a:rPr sz="1800">
-                <a:solidFill>
-                  <a:srgbClr val="666666"/>
-                </a:solidFill>
-                <a:latin typeface="Courier"/>
-              </a:rPr>
-              <a:t>%&gt;%</a:t>
-            </a:r>
-            <a:br/>
-            <a:r>
-              <a:rPr sz="1800">
-                <a:solidFill>
-                  <a:srgbClr val="4070A0"/>
-                </a:solidFill>
-                <a:latin typeface="Courier"/>
-              </a:rPr>
-              <a:t>  </a:t>
-            </a:r>
-            <a:r>
-              <a:rPr sz="1800">
-                <a:latin typeface="Courier"/>
-              </a:rPr>
-              <a:t>dplyr</a:t>
-            </a:r>
-            <a:r>
-              <a:rPr sz="1800">
-                <a:solidFill>
-                  <a:srgbClr val="666666"/>
-                </a:solidFill>
-                <a:latin typeface="Courier"/>
-              </a:rPr>
-              <a:t>::</a:t>
-            </a:r>
-            <a:r>
-              <a:rPr sz="1800" b="1">
-                <a:solidFill>
-                  <a:srgbClr val="007020"/>
-                </a:solidFill>
-                <a:latin typeface="Courier"/>
-              </a:rPr>
-              <a:t>summarise</a:t>
-            </a:r>
-            <a:r>
-              <a:rPr sz="1800">
-                <a:latin typeface="Courier"/>
-              </a:rPr>
-              <a:t>(</a:t>
-            </a:r>
-            <a:r>
-              <a:rPr sz="1800">
-                <a:solidFill>
-                  <a:srgbClr val="902000"/>
-                </a:solidFill>
-                <a:latin typeface="Courier"/>
-              </a:rPr>
-              <a:t>number =</a:t>
-            </a:r>
-            <a:r>
-              <a:rPr sz="1800">
-                <a:latin typeface="Courier"/>
-              </a:rPr>
-              <a:t> </a:t>
-            </a:r>
-            <a:r>
-              <a:rPr sz="1800" b="1">
-                <a:solidFill>
-                  <a:srgbClr val="007020"/>
-                </a:solidFill>
-                <a:latin typeface="Courier"/>
-              </a:rPr>
-              <a:t>n</a:t>
-            </a:r>
-            <a:r>
-              <a:rPr sz="1800">
-                <a:latin typeface="Courier"/>
-              </a:rPr>
-              <a:t>())</a:t>
-            </a:r>
-          </a:p>
-          <a:p>
-            <a:pPr lvl="0" marL="1270000" indent="0">
-              <a:buNone/>
+              <a:rPr/>
+              <a:t>How many patients weigh more than 70kg?</a:t>
+            </a:r>
+          </a:p>
+          <a:p>
+            <a:pPr lvl="2"/>
+            <a:r>
+              <a:rPr/>
+              <a:t>Hint - look at the </a:t>
+            </a:r>
+            <a:r>
+              <a:rPr sz="1800">
+                <a:latin typeface="Courier"/>
+              </a:rPr>
+              <a:t>n()</a:t>
+            </a:r>
+            <a:r>
+              <a:rPr/>
+              <a:t> function.</a:t>
+            </a:r>
+          </a:p>
+          <a:p>
+            <a:pPr lvl="1">
+              <a:buAutoNum type="arabicPeriod"/>
             </a:pPr>
             <a:r>
-              <a:rPr sz="1800">
-                <a:latin typeface="Courier"/>
-              </a:rPr>
-              <a:t>## # A tibble: 1 x 1
-##   number
-##    &lt;int&gt;
-## 1   2508</a:t>
+              <a:rPr/>
+              <a:t>Outcome of patients who were 60 years or older?</a:t>
+            </a:r>
+          </a:p>
+          <a:p>
+            <a:pPr lvl="2"/>
+            <a:r>
+              <a:rPr/>
+              <a:t>What is the mean length of stay of patients who are 60 years or older?</a:t>
+            </a:r>
+          </a:p>
+          <a:p>
+            <a:pPr lvl="2"/>
+            <a:r>
+              <a:rPr/>
+              <a:t>How many of these patients were discharged alive?</a:t>
+            </a:r>
+          </a:p>
+          <a:p>
+            <a:pPr lvl="2"/>
+            <a:r>
+              <a:rPr/>
+              <a:t>Hint - the variable </a:t>
+            </a:r>
+            <a:r>
+              <a:rPr sz="1800">
+                <a:latin typeface="Courier"/>
+              </a:rPr>
+              <a:t>vital_status</a:t>
+            </a:r>
+            <a:r>
+              <a:rPr/>
+              <a:t> indicates if the patient was alive or dead on discharge.</a:t>
             </a:r>
           </a:p>
         </p:txBody>
@@ -11908,6 +11605,315 @@
 </file>
 
 <file path=ppt/slides/slide37.xml><?xml version="1.0" encoding="utf-8"?>
+<p:sld xmlns:a="http://schemas.openxmlformats.org/drawingml/2006/main" xmlns:r="http://schemas.openxmlformats.org/officeDocument/2006/relationships" xmlns:p="http://schemas.openxmlformats.org/presentationml/2006/main">
+  <p:cSld>
+    <p:spTree>
+      <p:nvGrpSpPr>
+        <p:cNvPr id="1" name=""/>
+        <p:cNvGrpSpPr/>
+        <p:nvPr/>
+      </p:nvGrpSpPr>
+      <p:grpSpPr>
+        <a:xfrm>
+          <a:off x="0" y="0"/>
+          <a:ext cx="0" cy="0"/>
+          <a:chOff x="0" y="0"/>
+          <a:chExt cx="0" cy="0"/>
+        </a:xfrm>
+      </p:grpSpPr>
+      <p:sp>
+        <p:nvSpPr>
+          <p:cNvPr id="2" name="Title 1">
+            <a:extLst>
+              <a:ext uri="{FF2B5EF4-FFF2-40B4-BE49-F238E27FC236}">
+                <a16:creationId xmlns:a16="http://schemas.microsoft.com/office/drawing/2014/main" id="{5567D468-EE70-CD4E-A3AC-039CC11EF1FB}"/>
+              </a:ext>
+            </a:extLst>
+          </p:cNvPr>
+          <p:cNvSpPr>
+            <a:spLocks noGrp="1"/>
+          </p:cNvSpPr>
+          <p:nvPr>
+            <p:ph type="title"/>
+          </p:nvPr>
+        </p:nvSpPr>
+        <p:spPr/>
+        <p:txBody>
+          <a:bodyPr/>
+          <a:lstStyle/>
+          <a:p>
+            <a:pPr lvl="0" marL="0" indent="0">
+              <a:buNone/>
+            </a:pPr>
+            <a:r>
+              <a:rPr/>
+              <a:t>How</a:t>
+            </a:r>
+            <a:r>
+              <a:rPr/>
+              <a:t> </a:t>
+            </a:r>
+            <a:r>
+              <a:rPr/>
+              <a:t>many</a:t>
+            </a:r>
+            <a:r>
+              <a:rPr/>
+              <a:t> </a:t>
+            </a:r>
+            <a:r>
+              <a:rPr/>
+              <a:t>patients</a:t>
+            </a:r>
+            <a:r>
+              <a:rPr/>
+              <a:t> </a:t>
+            </a:r>
+            <a:r>
+              <a:rPr/>
+              <a:t>weigh</a:t>
+            </a:r>
+            <a:r>
+              <a:rPr/>
+              <a:t> </a:t>
+            </a:r>
+            <a:r>
+              <a:rPr/>
+              <a:t>more</a:t>
+            </a:r>
+            <a:r>
+              <a:rPr/>
+              <a:t> </a:t>
+            </a:r>
+            <a:r>
+              <a:rPr/>
+              <a:t>than</a:t>
+            </a:r>
+            <a:r>
+              <a:rPr/>
+              <a:t> </a:t>
+            </a:r>
+            <a:r>
+              <a:rPr/>
+              <a:t>70kg?</a:t>
+            </a:r>
+          </a:p>
+        </p:txBody>
+      </p:sp>
+      <p:sp>
+        <p:nvSpPr>
+          <p:cNvPr id="3" name="Content Placeholder 2">
+            <a:extLst>
+              <a:ext uri="{FF2B5EF4-FFF2-40B4-BE49-F238E27FC236}">
+                <a16:creationId xmlns:a16="http://schemas.microsoft.com/office/drawing/2014/main" id="{D10DDA37-E46B-B641-BC9F-636CB92A2C08}"/>
+              </a:ext>
+            </a:extLst>
+          </p:cNvPr>
+          <p:cNvSpPr>
+            <a:spLocks noGrp="1"/>
+          </p:cNvSpPr>
+          <p:nvPr>
+            <p:ph idx="1"/>
+          </p:nvPr>
+        </p:nvSpPr>
+        <p:spPr/>
+        <p:txBody>
+          <a:bodyPr/>
+          <a:lstStyle/>
+          <a:p>
+            <a:pPr lvl="0" marL="1270000" indent="0">
+              <a:buNone/>
+            </a:pPr>
+            <a:r>
+              <a:rPr sz="1800">
+                <a:latin typeface="Courier"/>
+              </a:rPr>
+              <a:t>cchic </a:t>
+            </a:r>
+            <a:r>
+              <a:rPr sz="1800">
+                <a:solidFill>
+                  <a:srgbClr val="666666"/>
+                </a:solidFill>
+                <a:latin typeface="Courier"/>
+              </a:rPr>
+              <a:t>%&gt;%</a:t>
+            </a:r>
+            <a:br/>
+            <a:r>
+              <a:rPr sz="1800">
+                <a:solidFill>
+                  <a:srgbClr val="4070A0"/>
+                </a:solidFill>
+                <a:latin typeface="Courier"/>
+              </a:rPr>
+              <a:t>  </a:t>
+            </a:r>
+            <a:r>
+              <a:rPr sz="1800">
+                <a:latin typeface="Courier"/>
+              </a:rPr>
+              <a:t>dplyr</a:t>
+            </a:r>
+            <a:r>
+              <a:rPr sz="1800">
+                <a:solidFill>
+                  <a:srgbClr val="666666"/>
+                </a:solidFill>
+                <a:latin typeface="Courier"/>
+              </a:rPr>
+              <a:t>::</a:t>
+            </a:r>
+            <a:r>
+              <a:rPr sz="1800" b="1">
+                <a:solidFill>
+                  <a:srgbClr val="007020"/>
+                </a:solidFill>
+                <a:latin typeface="Courier"/>
+              </a:rPr>
+              <a:t>filter</a:t>
+            </a:r>
+            <a:r>
+              <a:rPr sz="1800">
+                <a:latin typeface="Courier"/>
+              </a:rPr>
+              <a:t>(weight </a:t>
+            </a:r>
+            <a:r>
+              <a:rPr sz="1800">
+                <a:solidFill>
+                  <a:srgbClr val="666666"/>
+                </a:solidFill>
+                <a:latin typeface="Courier"/>
+              </a:rPr>
+              <a:t>&gt;</a:t>
+            </a:r>
+            <a:r>
+              <a:rPr sz="1800">
+                <a:solidFill>
+                  <a:srgbClr val="4070A0"/>
+                </a:solidFill>
+                <a:latin typeface="Courier"/>
+              </a:rPr>
+              <a:t> </a:t>
+            </a:r>
+            <a:r>
+              <a:rPr sz="1800">
+                <a:solidFill>
+                  <a:srgbClr val="40A070"/>
+                </a:solidFill>
+                <a:latin typeface="Courier"/>
+              </a:rPr>
+              <a:t>70</a:t>
+            </a:r>
+            <a:r>
+              <a:rPr sz="1800">
+                <a:latin typeface="Courier"/>
+              </a:rPr>
+              <a:t>) </a:t>
+            </a:r>
+            <a:r>
+              <a:rPr sz="1800">
+                <a:solidFill>
+                  <a:srgbClr val="666666"/>
+                </a:solidFill>
+                <a:latin typeface="Courier"/>
+              </a:rPr>
+              <a:t>%&gt;%</a:t>
+            </a:r>
+            <a:br/>
+            <a:r>
+              <a:rPr sz="1800">
+                <a:solidFill>
+                  <a:srgbClr val="4070A0"/>
+                </a:solidFill>
+                <a:latin typeface="Courier"/>
+              </a:rPr>
+              <a:t>  </a:t>
+            </a:r>
+            <a:r>
+              <a:rPr sz="1800">
+                <a:latin typeface="Courier"/>
+              </a:rPr>
+              <a:t>dplyr</a:t>
+            </a:r>
+            <a:r>
+              <a:rPr sz="1800">
+                <a:solidFill>
+                  <a:srgbClr val="666666"/>
+                </a:solidFill>
+                <a:latin typeface="Courier"/>
+              </a:rPr>
+              <a:t>::</a:t>
+            </a:r>
+            <a:r>
+              <a:rPr sz="1800" b="1">
+                <a:solidFill>
+                  <a:srgbClr val="007020"/>
+                </a:solidFill>
+                <a:latin typeface="Courier"/>
+              </a:rPr>
+              <a:t>summarise</a:t>
+            </a:r>
+            <a:r>
+              <a:rPr sz="1800">
+                <a:latin typeface="Courier"/>
+              </a:rPr>
+              <a:t>(</a:t>
+            </a:r>
+            <a:r>
+              <a:rPr sz="1800">
+                <a:solidFill>
+                  <a:srgbClr val="902000"/>
+                </a:solidFill>
+                <a:latin typeface="Courier"/>
+              </a:rPr>
+              <a:t>number =</a:t>
+            </a:r>
+            <a:r>
+              <a:rPr sz="1800">
+                <a:latin typeface="Courier"/>
+              </a:rPr>
+              <a:t> </a:t>
+            </a:r>
+            <a:r>
+              <a:rPr sz="1800" b="1">
+                <a:solidFill>
+                  <a:srgbClr val="007020"/>
+                </a:solidFill>
+                <a:latin typeface="Courier"/>
+              </a:rPr>
+              <a:t>n</a:t>
+            </a:r>
+            <a:r>
+              <a:rPr sz="1800">
+                <a:latin typeface="Courier"/>
+              </a:rPr>
+              <a:t>())</a:t>
+            </a:r>
+          </a:p>
+          <a:p>
+            <a:pPr lvl="0" marL="1270000" indent="0">
+              <a:buNone/>
+            </a:pPr>
+            <a:r>
+              <a:rPr sz="1800">
+                <a:latin typeface="Courier"/>
+              </a:rPr>
+              <a:t>## # A tibble: 1 x 1
+##   number
+##    &lt;int&gt;
+## 1   2508</a:t>
+            </a:r>
+          </a:p>
+        </p:txBody>
+      </p:sp>
+    </p:spTree>
+  </p:cSld>
+</p:sld>
+</file>
+
+<file path=ppt/slides/slide38.xml><?xml version="1.0" encoding="utf-8"?>
 <p:sld xmlns:a="http://schemas.openxmlformats.org/drawingml/2006/main" xmlns:r="http://schemas.openxmlformats.org/officeDocument/2006/relationships" xmlns:p="http://schemas.openxmlformats.org/presentationml/2006/main">
   <p:cSld>
     <p:spTree>

</xml_diff>